<commit_message>
Minor changes on slides for week 10
</commit_message>
<xml_diff>
--- a/Lectures/week 10/week 10- Frequent Itemsets.pptx
+++ b/Lectures/week 10/week 10- Frequent Itemsets.pptx
@@ -1423,7 +1423,7 @@
           <a:p>
             <a:r>
               <a:rPr lang="en-US" baseline="0" dirty="0"/>
-              <a:t>We can definitely say, that any subset of size k-1 must be frequent. We can also order those subsets. We can that even say that two order subsets that differ only in the last position must be frequent. This gives is now a </a:t>
+              <a:t>We can definitely say, that any subset of size k-1 must be frequent. We can also order those subsets by their elements. We can that even say that two order subsets that differ only in the last position must be frequent. This gives is now a </a:t>
             </a:r>
             <a:r>
               <a:rPr lang="en-US" baseline="0" dirty="0" err="1"/>
@@ -11889,7 +11889,7 @@
           <a:graphicData uri="http://schemas.openxmlformats.org/presentationml/2006/ole">
             <mc:AlternateContent xmlns:mc="http://schemas.openxmlformats.org/markup-compatibility/2006">
               <mc:Choice xmlns:v="urn:schemas-microsoft-com:vml" Requires="v">
-                <p:oleObj spid="_x0000_s502130" name="Worksheet" r:id="rId5" imgW="5765800" imgH="1562100" progId="Excel.Sheet.8">
+                <p:oleObj spid="_x0000_s502134" name="Worksheet" r:id="rId5" imgW="5765800" imgH="1562100" progId="Excel.Sheet.8">
                   <p:embed/>
                 </p:oleObj>
               </mc:Choice>
@@ -11924,6 +11924,7 @@
                         <a:noFill/>
                       </a:ln>
                       <a:effectLst/>
+                      <a:extLst/>
                     </p:spPr>
                   </p:pic>
                 </p:oleObj>
@@ -14485,7 +14486,7 @@
           <a:graphicData uri="http://schemas.openxmlformats.org/presentationml/2006/ole">
             <mc:AlternateContent xmlns:mc="http://schemas.openxmlformats.org/markup-compatibility/2006">
               <mc:Choice xmlns:v="urn:schemas-microsoft-com:vml" Requires="v">
-                <p:oleObj spid="_x0000_s506181" name="Worksheet" r:id="rId4" imgW="5765800" imgH="1562100" progId="Excel.Sheet.8">
+                <p:oleObj spid="_x0000_s506185" name="Worksheet" r:id="rId4" imgW="5765800" imgH="1562100" progId="Excel.Sheet.8">
                   <p:embed/>
                 </p:oleObj>
               </mc:Choice>
@@ -14520,6 +14521,7 @@
                         <a:noFill/>
                       </a:ln>
                       <a:effectLst/>
+                      <a:extLst/>
                     </p:spPr>
                   </p:pic>
                 </p:oleObj>
@@ -19375,7 +19377,7 @@
           <a:graphicData uri="http://schemas.openxmlformats.org/presentationml/2006/ole">
             <mc:AlternateContent xmlns:mc="http://schemas.openxmlformats.org/markup-compatibility/2006">
               <mc:Choice xmlns:v="urn:schemas-microsoft-com:vml" Requires="v">
-                <p:oleObj spid="_x0000_s512013" name="Worksheet" r:id="rId4" imgW="1930400" imgH="1498600" progId="Excel.Sheet.8">
+                <p:oleObj spid="_x0000_s512045" name="Worksheet" r:id="rId4" imgW="1930400" imgH="1498600" progId="Excel.Sheet.8">
                   <p:embed/>
                 </p:oleObj>
               </mc:Choice>
@@ -19412,14 +19414,14 @@
                       <a:effectLst/>
                       <a:extLst>
                         <a:ext uri="{909E8E84-426E-40dd-AFC4-6F175D3DCCD1}">
-                          <a14:hiddenFill xmlns="" xmlns:a14="http://schemas.microsoft.com/office/drawing/2010/main">
+                          <a14:hiddenFill xmlns:a14="http://schemas.microsoft.com/office/drawing/2010/main" xmlns="">
                             <a:solidFill>
                               <a:schemeClr val="accent1"/>
                             </a:solidFill>
                           </a14:hiddenFill>
                         </a:ext>
                         <a:ext uri="{91240B29-F687-4f45-9708-019B960494DF}">
-                          <a14:hiddenLine xmlns="" xmlns:a14="http://schemas.microsoft.com/office/drawing/2010/main" w="9525">
+                          <a14:hiddenLine xmlns:a14="http://schemas.microsoft.com/office/drawing/2010/main" xmlns="" w="9525">
                             <a:solidFill>
                               <a:schemeClr val="tx1"/>
                             </a:solidFill>
@@ -19429,7 +19431,7 @@
                           </a14:hiddenLine>
                         </a:ext>
                         <a:ext uri="{AF507438-7753-43e0-B8FC-AC1667EBCBE1}">
-                          <a14:hiddenEffects xmlns="" xmlns:a14="http://schemas.microsoft.com/office/drawing/2010/main">
+                          <a14:hiddenEffects xmlns:a14="http://schemas.microsoft.com/office/drawing/2010/main" xmlns="">
                             <a:effectLst>
                               <a:outerShdw blurRad="63500" dist="38099" dir="2700000" algn="ctr" rotWithShape="0">
                                 <a:schemeClr val="bg2">
@@ -19521,7 +19523,7 @@
           <a:graphicData uri="http://schemas.openxmlformats.org/presentationml/2006/ole">
             <mc:AlternateContent xmlns:mc="http://schemas.openxmlformats.org/markup-compatibility/2006">
               <mc:Choice xmlns:v="urn:schemas-microsoft-com:vml" Requires="v">
-                <p:oleObj spid="_x0000_s512014" name="Worksheet" r:id="rId6" imgW="1854200" imgH="1828800" progId="Excel.Sheet.8">
+                <p:oleObj spid="_x0000_s512046" name="Worksheet" r:id="rId6" imgW="1854200" imgH="1828800" progId="Excel.Sheet.8">
                   <p:embed/>
                 </p:oleObj>
               </mc:Choice>
@@ -19558,14 +19560,14 @@
                       <a:effectLst/>
                       <a:extLst>
                         <a:ext uri="{909E8E84-426E-40dd-AFC4-6F175D3DCCD1}">
-                          <a14:hiddenFill xmlns="" xmlns:a14="http://schemas.microsoft.com/office/drawing/2010/main">
+                          <a14:hiddenFill xmlns:a14="http://schemas.microsoft.com/office/drawing/2010/main" xmlns="">
                             <a:solidFill>
                               <a:schemeClr val="accent1"/>
                             </a:solidFill>
                           </a14:hiddenFill>
                         </a:ext>
                         <a:ext uri="{91240B29-F687-4f45-9708-019B960494DF}">
-                          <a14:hiddenLine xmlns="" xmlns:a14="http://schemas.microsoft.com/office/drawing/2010/main" w="9525">
+                          <a14:hiddenLine xmlns:a14="http://schemas.microsoft.com/office/drawing/2010/main" xmlns="" w="9525">
                             <a:solidFill>
                               <a:schemeClr val="tx1"/>
                             </a:solidFill>
@@ -19575,7 +19577,7 @@
                           </a14:hiddenLine>
                         </a:ext>
                         <a:ext uri="{AF507438-7753-43e0-B8FC-AC1667EBCBE1}">
-                          <a14:hiddenEffects xmlns="" xmlns:a14="http://schemas.microsoft.com/office/drawing/2010/main">
+                          <a14:hiddenEffects xmlns:a14="http://schemas.microsoft.com/office/drawing/2010/main" xmlns="">
                             <a:effectLst>
                               <a:outerShdw blurRad="63500" dist="38099" dir="2700000" algn="ctr" rotWithShape="0">
                                 <a:schemeClr val="bg2">
@@ -19616,7 +19618,7 @@
           <a:graphicData uri="http://schemas.openxmlformats.org/presentationml/2006/ole">
             <mc:AlternateContent xmlns:mc="http://schemas.openxmlformats.org/markup-compatibility/2006">
               <mc:Choice xmlns:v="urn:schemas-microsoft-com:vml" Requires="v">
-                <p:oleObj spid="_x0000_s512015" name="Worksheet" r:id="rId8" imgW="1854200" imgH="1536700" progId="Excel.Sheet.8">
+                <p:oleObj spid="_x0000_s512047" name="Worksheet" r:id="rId8" imgW="1854200" imgH="1536700" progId="Excel.Sheet.8">
                   <p:embed/>
                 </p:oleObj>
               </mc:Choice>
@@ -19653,14 +19655,14 @@
                       <a:effectLst/>
                       <a:extLst>
                         <a:ext uri="{909E8E84-426E-40dd-AFC4-6F175D3DCCD1}">
-                          <a14:hiddenFill xmlns="" xmlns:a14="http://schemas.microsoft.com/office/drawing/2010/main">
+                          <a14:hiddenFill xmlns:a14="http://schemas.microsoft.com/office/drawing/2010/main" xmlns="">
                             <a:solidFill>
                               <a:schemeClr val="accent1"/>
                             </a:solidFill>
                           </a14:hiddenFill>
                         </a:ext>
                         <a:ext uri="{91240B29-F687-4f45-9708-019B960494DF}">
-                          <a14:hiddenLine xmlns="" xmlns:a14="http://schemas.microsoft.com/office/drawing/2010/main" w="9525">
+                          <a14:hiddenLine xmlns:a14="http://schemas.microsoft.com/office/drawing/2010/main" xmlns="" w="9525">
                             <a:solidFill>
                               <a:schemeClr val="tx1"/>
                             </a:solidFill>
@@ -19670,7 +19672,7 @@
                           </a14:hiddenLine>
                         </a:ext>
                         <a:ext uri="{AF507438-7753-43e0-B8FC-AC1667EBCBE1}">
-                          <a14:hiddenEffects xmlns="" xmlns:a14="http://schemas.microsoft.com/office/drawing/2010/main">
+                          <a14:hiddenEffects xmlns:a14="http://schemas.microsoft.com/office/drawing/2010/main" xmlns="">
                             <a:effectLst>
                               <a:outerShdw blurRad="63500" dist="38099" dir="2700000" algn="ctr" rotWithShape="0">
                                 <a:schemeClr val="bg2">
@@ -19819,7 +19821,7 @@
           <a:graphicData uri="http://schemas.openxmlformats.org/presentationml/2006/ole">
             <mc:AlternateContent xmlns:mc="http://schemas.openxmlformats.org/markup-compatibility/2006">
               <mc:Choice xmlns:v="urn:schemas-microsoft-com:vml" Requires="v">
-                <p:oleObj spid="_x0000_s512016" name="Worksheet" r:id="rId10" imgW="1130300" imgH="2120900" progId="Excel.Sheet.8">
+                <p:oleObj spid="_x0000_s512048" name="Worksheet" r:id="rId10" imgW="1130300" imgH="2120900" progId="Excel.Sheet.8">
                   <p:embed/>
                 </p:oleObj>
               </mc:Choice>
@@ -19856,14 +19858,14 @@
                       <a:effectLst/>
                       <a:extLst>
                         <a:ext uri="{909E8E84-426E-40dd-AFC4-6F175D3DCCD1}">
-                          <a14:hiddenFill xmlns="" xmlns:a14="http://schemas.microsoft.com/office/drawing/2010/main">
+                          <a14:hiddenFill xmlns:a14="http://schemas.microsoft.com/office/drawing/2010/main" xmlns="">
                             <a:solidFill>
                               <a:schemeClr val="accent1"/>
                             </a:solidFill>
                           </a14:hiddenFill>
                         </a:ext>
                         <a:ext uri="{91240B29-F687-4f45-9708-019B960494DF}">
-                          <a14:hiddenLine xmlns="" xmlns:a14="http://schemas.microsoft.com/office/drawing/2010/main" w="9525">
+                          <a14:hiddenLine xmlns:a14="http://schemas.microsoft.com/office/drawing/2010/main" xmlns="" w="9525">
                             <a:solidFill>
                               <a:schemeClr val="tx1"/>
                             </a:solidFill>
@@ -19873,7 +19875,7 @@
                           </a14:hiddenLine>
                         </a:ext>
                         <a:ext uri="{AF507438-7753-43e0-B8FC-AC1667EBCBE1}">
-                          <a14:hiddenEffects xmlns="" xmlns:a14="http://schemas.microsoft.com/office/drawing/2010/main">
+                          <a14:hiddenEffects xmlns:a14="http://schemas.microsoft.com/office/drawing/2010/main" xmlns="">
                             <a:effectLst>
                               <a:outerShdw blurRad="63500" dist="38099" dir="2700000" algn="ctr" rotWithShape="0">
                                 <a:schemeClr val="bg2">
@@ -19914,7 +19916,7 @@
           <a:graphicData uri="http://schemas.openxmlformats.org/presentationml/2006/ole">
             <mc:AlternateContent xmlns:mc="http://schemas.openxmlformats.org/markup-compatibility/2006">
               <mc:Choice xmlns:v="urn:schemas-microsoft-com:vml" Requires="v">
-                <p:oleObj spid="_x0000_s512017" name="Worksheet" r:id="rId12" imgW="1803400" imgH="2120900" progId="Excel.Sheet.8">
+                <p:oleObj spid="_x0000_s512049" name="Worksheet" r:id="rId12" imgW="1803400" imgH="2120900" progId="Excel.Sheet.8">
                   <p:embed/>
                 </p:oleObj>
               </mc:Choice>
@@ -19951,14 +19953,14 @@
                       <a:effectLst/>
                       <a:extLst>
                         <a:ext uri="{909E8E84-426E-40dd-AFC4-6F175D3DCCD1}">
-                          <a14:hiddenFill xmlns="" xmlns:a14="http://schemas.microsoft.com/office/drawing/2010/main">
+                          <a14:hiddenFill xmlns:a14="http://schemas.microsoft.com/office/drawing/2010/main" xmlns="">
                             <a:solidFill>
                               <a:schemeClr val="accent1"/>
                             </a:solidFill>
                           </a14:hiddenFill>
                         </a:ext>
                         <a:ext uri="{91240B29-F687-4f45-9708-019B960494DF}">
-                          <a14:hiddenLine xmlns="" xmlns:a14="http://schemas.microsoft.com/office/drawing/2010/main" w="9525">
+                          <a14:hiddenLine xmlns:a14="http://schemas.microsoft.com/office/drawing/2010/main" xmlns="" w="9525">
                             <a:solidFill>
                               <a:schemeClr val="tx1"/>
                             </a:solidFill>
@@ -19968,7 +19970,7 @@
                           </a14:hiddenLine>
                         </a:ext>
                         <a:ext uri="{AF507438-7753-43e0-B8FC-AC1667EBCBE1}">
-                          <a14:hiddenEffects xmlns="" xmlns:a14="http://schemas.microsoft.com/office/drawing/2010/main">
+                          <a14:hiddenEffects xmlns:a14="http://schemas.microsoft.com/office/drawing/2010/main" xmlns="">
                             <a:effectLst>
                               <a:outerShdw blurRad="63500" dist="38099" dir="2700000" algn="ctr" rotWithShape="0">
                                 <a:schemeClr val="bg2">
@@ -20009,7 +20011,7 @@
           <a:graphicData uri="http://schemas.openxmlformats.org/presentationml/2006/ole">
             <mc:AlternateContent xmlns:mc="http://schemas.openxmlformats.org/markup-compatibility/2006">
               <mc:Choice xmlns:v="urn:schemas-microsoft-com:vml" Requires="v">
-                <p:oleObj spid="_x0000_s512018" name="Worksheet" r:id="rId14" imgW="1803400" imgH="1536700" progId="Excel.Sheet.8">
+                <p:oleObj spid="_x0000_s512050" name="Worksheet" r:id="rId14" imgW="1803400" imgH="1536700" progId="Excel.Sheet.8">
                   <p:embed/>
                 </p:oleObj>
               </mc:Choice>
@@ -20046,14 +20048,14 @@
                       <a:effectLst/>
                       <a:extLst>
                         <a:ext uri="{909E8E84-426E-40dd-AFC4-6F175D3DCCD1}">
-                          <a14:hiddenFill xmlns="" xmlns:a14="http://schemas.microsoft.com/office/drawing/2010/main">
+                          <a14:hiddenFill xmlns:a14="http://schemas.microsoft.com/office/drawing/2010/main" xmlns="">
                             <a:solidFill>
                               <a:schemeClr val="accent1"/>
                             </a:solidFill>
                           </a14:hiddenFill>
                         </a:ext>
                         <a:ext uri="{91240B29-F687-4f45-9708-019B960494DF}">
-                          <a14:hiddenLine xmlns="" xmlns:a14="http://schemas.microsoft.com/office/drawing/2010/main" w="9525">
+                          <a14:hiddenLine xmlns:a14="http://schemas.microsoft.com/office/drawing/2010/main" xmlns="" w="9525">
                             <a:solidFill>
                               <a:schemeClr val="tx1"/>
                             </a:solidFill>
@@ -20063,7 +20065,7 @@
                           </a14:hiddenLine>
                         </a:ext>
                         <a:ext uri="{AF507438-7753-43e0-B8FC-AC1667EBCBE1}">
-                          <a14:hiddenEffects xmlns="" xmlns:a14="http://schemas.microsoft.com/office/drawing/2010/main">
+                          <a14:hiddenEffects xmlns:a14="http://schemas.microsoft.com/office/drawing/2010/main" xmlns="">
                             <a:effectLst>
                               <a:outerShdw blurRad="63500" dist="38099" dir="2700000" algn="ctr" rotWithShape="0">
                                 <a:schemeClr val="bg2">
@@ -20395,7 +20397,7 @@
           <a:graphicData uri="http://schemas.openxmlformats.org/presentationml/2006/ole">
             <mc:AlternateContent xmlns:mc="http://schemas.openxmlformats.org/markup-compatibility/2006">
               <mc:Choice xmlns:v="urn:schemas-microsoft-com:vml" Requires="v">
-                <p:oleObj spid="_x0000_s512019" name="Worksheet" r:id="rId16" imgW="1130300" imgH="622300" progId="Excel.Sheet.8">
+                <p:oleObj spid="_x0000_s512051" name="Worksheet" r:id="rId16" imgW="1130300" imgH="622300" progId="Excel.Sheet.8">
                   <p:embed/>
                 </p:oleObj>
               </mc:Choice>
@@ -20430,6 +20432,7 @@
                         <a:noFill/>
                       </a:ln>
                       <a:effectLst/>
+                      <a:extLst/>
                     </p:spPr>
                   </p:pic>
                 </p:oleObj>
@@ -20460,7 +20463,7 @@
           <a:graphicData uri="http://schemas.openxmlformats.org/presentationml/2006/ole">
             <mc:AlternateContent xmlns:mc="http://schemas.openxmlformats.org/markup-compatibility/2006">
               <mc:Choice xmlns:v="urn:schemas-microsoft-com:vml" Requires="v">
-                <p:oleObj spid="_x0000_s512020" name="Worksheet" r:id="rId18" imgW="1803400" imgH="609600" progId="Excel.Sheet.8">
+                <p:oleObj spid="_x0000_s512052" name="Worksheet" r:id="rId18" imgW="1803400" imgH="609600" progId="Excel.Sheet.8">
                   <p:embed/>
                 </p:oleObj>
               </mc:Choice>
@@ -20495,6 +20498,7 @@
                         <a:noFill/>
                       </a:ln>
                       <a:effectLst/>
+                      <a:extLst/>
                     </p:spPr>
                   </p:pic>
                 </p:oleObj>
@@ -21562,7 +21566,7 @@
           <a:graphicData uri="http://schemas.openxmlformats.org/presentationml/2006/ole">
             <mc:AlternateContent xmlns:mc="http://schemas.openxmlformats.org/markup-compatibility/2006">
               <mc:Choice xmlns:v="urn:schemas-microsoft-com:vml" Requires="v">
-                <p:oleObj spid="_x0000_s508805" name="Worksheet" r:id="rId4" imgW="1930400" imgH="1498600" progId="Excel.Sheet.8">
+                <p:oleObj spid="_x0000_s508821" name="Worksheet" r:id="rId4" imgW="1930400" imgH="1498600" progId="Excel.Sheet.8">
                   <p:embed/>
                 </p:oleObj>
               </mc:Choice>
@@ -21599,14 +21603,14 @@
                       <a:effectLst/>
                       <a:extLst>
                         <a:ext uri="{909E8E84-426E-40dd-AFC4-6F175D3DCCD1}">
-                          <a14:hiddenFill xmlns="" xmlns:a14="http://schemas.microsoft.com/office/drawing/2010/main">
+                          <a14:hiddenFill xmlns:a14="http://schemas.microsoft.com/office/drawing/2010/main" xmlns="">
                             <a:solidFill>
                               <a:schemeClr val="accent1"/>
                             </a:solidFill>
                           </a14:hiddenFill>
                         </a:ext>
                         <a:ext uri="{91240B29-F687-4f45-9708-019B960494DF}">
-                          <a14:hiddenLine xmlns="" xmlns:a14="http://schemas.microsoft.com/office/drawing/2010/main" w="9525">
+                          <a14:hiddenLine xmlns:a14="http://schemas.microsoft.com/office/drawing/2010/main" xmlns="" w="9525">
                             <a:solidFill>
                               <a:schemeClr val="tx1"/>
                             </a:solidFill>
@@ -21616,7 +21620,7 @@
                           </a14:hiddenLine>
                         </a:ext>
                         <a:ext uri="{AF507438-7753-43e0-B8FC-AC1667EBCBE1}">
-                          <a14:hiddenEffects xmlns="" xmlns:a14="http://schemas.microsoft.com/office/drawing/2010/main">
+                          <a14:hiddenEffects xmlns:a14="http://schemas.microsoft.com/office/drawing/2010/main" xmlns="">
                             <a:effectLst>
                               <a:outerShdw blurRad="63500" dist="38099" dir="2700000" algn="ctr" rotWithShape="0">
                                 <a:schemeClr val="bg2">
@@ -21671,7 +21675,7 @@
             <a:graphicData uri="http://schemas.openxmlformats.org/presentationml/2006/ole">
               <mc:AlternateContent xmlns:mc="http://schemas.openxmlformats.org/markup-compatibility/2006">
                 <mc:Choice xmlns:v="urn:schemas-microsoft-com:vml" Requires="v">
-                  <p:oleObj spid="_x0000_s508806" name="Worksheet" r:id="rId6" imgW="1854200" imgH="1536700" progId="Excel.Sheet.8">
+                  <p:oleObj spid="_x0000_s508822" name="Worksheet" r:id="rId6" imgW="1854200" imgH="1536700" progId="Excel.Sheet.8">
                     <p:embed/>
                   </p:oleObj>
                 </mc:Choice>
@@ -21708,14 +21712,14 @@
                         <a:effectLst/>
                         <a:extLst>
                           <a:ext uri="{909E8E84-426E-40dd-AFC4-6F175D3DCCD1}">
-                            <a14:hiddenFill xmlns="" xmlns:a14="http://schemas.microsoft.com/office/drawing/2010/main">
+                            <a14:hiddenFill xmlns:a14="http://schemas.microsoft.com/office/drawing/2010/main" xmlns="">
                               <a:solidFill>
                                 <a:schemeClr val="accent1"/>
                               </a:solidFill>
                             </a14:hiddenFill>
                           </a:ext>
                           <a:ext uri="{91240B29-F687-4f45-9708-019B960494DF}">
-                            <a14:hiddenLine xmlns="" xmlns:a14="http://schemas.microsoft.com/office/drawing/2010/main" w="9525">
+                            <a14:hiddenLine xmlns:a14="http://schemas.microsoft.com/office/drawing/2010/main" xmlns="" w="9525">
                               <a:solidFill>
                                 <a:schemeClr val="tx1"/>
                               </a:solidFill>
@@ -21725,7 +21729,7 @@
                             </a14:hiddenLine>
                           </a:ext>
                           <a:ext uri="{AF507438-7753-43e0-B8FC-AC1667EBCBE1}">
-                            <a14:hiddenEffects xmlns="" xmlns:a14="http://schemas.microsoft.com/office/drawing/2010/main">
+                            <a14:hiddenEffects xmlns:a14="http://schemas.microsoft.com/office/drawing/2010/main" xmlns="">
                               <a:effectLst>
                                 <a:outerShdw blurRad="63500" dist="38099" dir="2700000" algn="ctr" rotWithShape="0">
                                   <a:schemeClr val="bg2">
@@ -21766,7 +21770,7 @@
             <a:graphicData uri="http://schemas.openxmlformats.org/presentationml/2006/ole">
               <mc:AlternateContent xmlns:mc="http://schemas.openxmlformats.org/markup-compatibility/2006">
                 <mc:Choice xmlns:v="urn:schemas-microsoft-com:vml" Requires="v">
-                  <p:oleObj spid="_x0000_s508807" name="Worksheet" r:id="rId8" imgW="1803400" imgH="1384300" progId="Excel.Sheet.8">
+                  <p:oleObj spid="_x0000_s508823" name="Worksheet" r:id="rId8" imgW="1803400" imgH="1384300" progId="Excel.Sheet.8">
                     <p:embed/>
                   </p:oleObj>
                 </mc:Choice>
@@ -21801,6 +21805,7 @@
                           <a:noFill/>
                         </a:ln>
                         <a:effectLst/>
+                        <a:extLst/>
                       </p:spPr>
                     </p:pic>
                   </p:oleObj>
@@ -21831,7 +21836,7 @@
             <a:graphicData uri="http://schemas.openxmlformats.org/presentationml/2006/ole">
               <mc:AlternateContent xmlns:mc="http://schemas.openxmlformats.org/markup-compatibility/2006">
                 <mc:Choice xmlns:v="urn:schemas-microsoft-com:vml" Requires="v">
-                  <p:oleObj spid="_x0000_s508808" name="Worksheet" r:id="rId10" imgW="1803400" imgH="469900" progId="Excel.Sheet.8">
+                  <p:oleObj spid="_x0000_s508824" name="Worksheet" r:id="rId10" imgW="1803400" imgH="469900" progId="Excel.Sheet.8">
                     <p:embed/>
                   </p:oleObj>
                 </mc:Choice>
@@ -21866,6 +21871,7 @@
                           <a:noFill/>
                         </a:ln>
                         <a:effectLst/>
+                        <a:extLst/>
                       </p:spPr>
                     </p:pic>
                   </p:oleObj>
@@ -22923,8 +22929,8 @@
           </a:p>
         </p:txBody>
       </p:sp>
-      <mc:AlternateContent xmlns:mc="http://schemas.openxmlformats.org/markup-compatibility/2006" xmlns:a14="http://schemas.microsoft.com/office/drawing/2010/main">
-        <mc:Choice Requires="a14">
+      <mc:AlternateContent xmlns:mc="http://schemas.openxmlformats.org/markup-compatibility/2006">
+        <mc:Choice xmlns:a14="http://schemas.microsoft.com/office/drawing/2010/main" Requires="a14">
           <p:sp>
             <p:nvSpPr>
               <p:cNvPr id="3" name="Content Placeholder 2"/>
@@ -22985,20 +22991,8 @@
                 </a:r>
                 <a:r>
                   <a:rPr lang="en-GB" sz="2400" i="1" dirty="0"/>
-                  <a:t>x, x</a:t>
+                  <a:t>x, </a:t>
                 </a:r>
-                <a14:m>
-                  <m:oMath xmlns:m="http://schemas.openxmlformats.org/officeDocument/2006/math">
-                    <m:r>
-                      <a:rPr lang="en-GB" sz="2400" i="1" smtClean="0">
-                        <a:latin typeface="Cambria Math" charset="0"/>
-                        <a:ea typeface="Cambria Math" charset="0"/>
-                        <a:cs typeface="Cambria Math" charset="0"/>
-                      </a:rPr>
-                      <m:t>∈</m:t>
-                    </m:r>
-                  </m:oMath>
-                </a14:m>
                 <a:r>
                   <a:rPr lang="en-GB" sz="2400" dirty="0"/>
                   <a:t>{items})	a property of </a:t>
@@ -23019,17 +23013,15 @@
                 </a:r>
                 <a:r>
                   <a:rPr lang="en-GB" sz="2400" i="1" dirty="0"/>
-                  <a:t>x, x</a:t>
+                  <a:t>x,</a:t>
                 </a:r>
                 <a14:m>
                   <m:oMath xmlns:m="http://schemas.openxmlformats.org/officeDocument/2006/math">
                     <m:r>
-                      <a:rPr lang="en-GB" sz="2400" i="1">
-                        <a:latin typeface="Cambria Math" charset="0"/>
-                        <a:ea typeface="Cambria Math" charset="0"/>
-                        <a:cs typeface="Cambria Math" charset="0"/>
+                      <a:rPr lang="en-GB" sz="2400" i="1" smtClean="0">
+                        <a:latin typeface="Cambria Math" panose="02040503050406030204" pitchFamily="18" charset="0"/>
                       </a:rPr>
-                      <m:t>∈</m:t>
+                      <m:t> </m:t>
                     </m:r>
                   </m:oMath>
                 </a14:m>
@@ -23085,7 +23077,7 @@
             </p:txBody>
           </p:sp>
         </mc:Choice>
-        <mc:Fallback xmlns="">
+        <mc:Fallback>
           <p:sp>
             <p:nvSpPr>
               <p:cNvPr id="3" name="Content Placeholder 2"/>
@@ -23101,10 +23093,10 @@
                 <a:off x="179388" y="1341438"/>
                 <a:ext cx="8785100" cy="5029200"/>
               </a:xfrm>
-              <a:blipFill rotWithShape="0">
+              <a:blipFill>
                 <a:blip r:embed="rId3"/>
                 <a:stretch>
-                  <a:fillRect l="-1734" t="-1576"/>
+                  <a:fillRect l="-1732" t="-1511"/>
                 </a:stretch>
               </a:blipFill>
             </p:spPr>
@@ -25256,7 +25248,7 @@
             </a:pPr>
             <a:r>
               <a:rPr lang="en-US" sz="2400" dirty="0"/>
-              <a:t>Items are sorted</a:t>
+              <a:t>Items are sorted by decreasing support</a:t>
             </a:r>
           </a:p>
           <a:p>
@@ -30234,8 +30226,16 @@
               <a:buAutoNum type="alphaUcPeriod"/>
             </a:pPr>
             <a:r>
-              <a:rPr lang="en-US"/>
-              <a:t>Frequent itemsets are extracted</a:t>
+              <a:rPr lang="en-US" dirty="0"/>
+              <a:t>Frequent </a:t>
+            </a:r>
+            <a:r>
+              <a:rPr lang="en-US" dirty="0" err="1"/>
+              <a:t>itemsets</a:t>
+            </a:r>
+            <a:r>
+              <a:rPr lang="en-US" dirty="0"/>
+              <a:t> are extracted</a:t>
             </a:r>
           </a:p>
           <a:p>
@@ -30244,7 +30244,7 @@
               <a:buAutoNum type="alphaUcPeriod"/>
             </a:pPr>
             <a:r>
-              <a:rPr lang="en-US"/>
+              <a:rPr lang="en-US" dirty="0"/>
               <a:t>A tree structure is constructed</a:t>
             </a:r>
           </a:p>
@@ -30254,8 +30254,8 @@
               <a:buAutoNum type="alphaUcPeriod"/>
             </a:pPr>
             <a:r>
-              <a:rPr lang="en-US"/>
-              <a:t>The frequency of itemsets is computed</a:t>
+              <a:rPr lang="en-US" dirty="0"/>
+              <a:t>The frequency of items is computed</a:t>
             </a:r>
           </a:p>
           <a:p>
@@ -30264,8 +30264,16 @@
               <a:buAutoNum type="alphaUcPeriod"/>
             </a:pPr>
             <a:r>
-              <a:rPr lang="en-US"/>
-              <a:t>Prefixes among itemsets are determined</a:t>
+              <a:rPr lang="en-US" dirty="0"/>
+              <a:t>Prefixes among </a:t>
+            </a:r>
+            <a:r>
+              <a:rPr lang="en-US" dirty="0" err="1"/>
+              <a:t>itemsets</a:t>
+            </a:r>
+            <a:r>
+              <a:rPr lang="en-US" dirty="0"/>
+              <a:t> are determined</a:t>
             </a:r>
           </a:p>
           <a:p>
@@ -30273,7 +30281,7 @@
               <a:buFont typeface="+mj-lt"/>
               <a:buAutoNum type="alphaUcPeriod"/>
             </a:pPr>
-            <a:endParaRPr lang="en-US"/>
+            <a:endParaRPr lang="en-US" dirty="0"/>
           </a:p>
         </p:txBody>
       </p:sp>
@@ -32066,7 +32074,7 @@
           <a:graphicData uri="http://schemas.openxmlformats.org/presentationml/2006/ole">
             <mc:AlternateContent xmlns:mc="http://schemas.openxmlformats.org/markup-compatibility/2006">
               <mc:Choice xmlns:v="urn:schemas-microsoft-com:vml" Requires="v">
-                <p:oleObj spid="_x0000_s1447" name="Worksheet" r:id="rId4" imgW="5765800" imgH="1562100" progId="Excel.Sheet.8">
+                <p:oleObj spid="_x0000_s1451" name="Worksheet" r:id="rId4" imgW="5765800" imgH="1562100" progId="Excel.Sheet.8">
                   <p:embed/>
                 </p:oleObj>
               </mc:Choice>
@@ -32101,6 +32109,7 @@
                         <a:noFill/>
                       </a:ln>
                       <a:effectLst/>
+                      <a:extLst/>
                     </p:spPr>
                   </p:pic>
                 </p:oleObj>
@@ -32336,7 +32345,7 @@
           <a:graphicData uri="http://schemas.openxmlformats.org/presentationml/2006/ole">
             <mc:AlternateContent xmlns:mc="http://schemas.openxmlformats.org/markup-compatibility/2006">
               <mc:Choice xmlns:v="urn:schemas-microsoft-com:vml" Requires="v">
-                <p:oleObj spid="_x0000_s501157" name="Worksheet" r:id="rId4" imgW="5765800" imgH="1562100" progId="Excel.Sheet.8">
+                <p:oleObj spid="_x0000_s501161" name="Worksheet" r:id="rId4" imgW="5765800" imgH="1562100" progId="Excel.Sheet.8">
                   <p:embed/>
                 </p:oleObj>
               </mc:Choice>
@@ -32371,6 +32380,7 @@
                         <a:noFill/>
                       </a:ln>
                       <a:effectLst/>
+                      <a:extLst/>
                     </p:spPr>
                   </p:pic>
                 </p:oleObj>
@@ -33727,7 +33737,12 @@
             <p:ph idx="1"/>
           </p:nvPr>
         </p:nvSpPr>
-        <p:spPr/>
+        <p:spPr>
+          <a:xfrm>
+            <a:off x="179388" y="1341438"/>
+            <a:ext cx="8929116" cy="5029200"/>
+          </a:xfrm>
+        </p:spPr>
         <p:txBody>
           <a:bodyPr/>
           <a:lstStyle/>
@@ -33999,7 +34014,36 @@
             <a:pPr lvl="1"/>
             <a:r>
               <a:rPr lang="en-GB" sz="2400" dirty="0"/>
-              <a:t>s = p(A </a:t>
+              <a:t>s(</a:t>
+            </a:r>
+            <a:r>
+              <a:rPr lang="en-US" sz="2400" dirty="0">
+                <a:latin typeface="Calibri" charset="0"/>
+                <a:ea typeface="Calibri" charset="0"/>
+                <a:cs typeface="Calibri" charset="0"/>
+              </a:rPr>
+              <a:t>A </a:t>
+            </a:r>
+            <a:r>
+              <a:rPr lang="en-GB" sz="2400" dirty="0">
+                <a:latin typeface="Wingdings"/>
+                <a:ea typeface="Wingdings"/>
+                <a:cs typeface="Wingdings"/>
+                <a:sym typeface="Wingdings"/>
+              </a:rPr>
+              <a:t></a:t>
+            </a:r>
+            <a:r>
+              <a:rPr lang="en-US" sz="2400" dirty="0">
+                <a:latin typeface="Calibri" charset="0"/>
+                <a:ea typeface="Calibri" charset="0"/>
+                <a:cs typeface="Calibri" charset="0"/>
+              </a:rPr>
+              <a:t> B </a:t>
+            </a:r>
+            <a:r>
+              <a:rPr lang="en-GB" sz="2400" dirty="0"/>
+              <a:t>) = s(A </a:t>
             </a:r>
             <a:r>
               <a:rPr lang="en-US" sz="1800" dirty="0" err="1">
@@ -34009,7 +34053,7 @@
             </a:r>
             <a:r>
               <a:rPr lang="en-GB" sz="2400" dirty="0"/>
-              <a:t> B) = count(A </a:t>
+              <a:t> B) = p(A </a:t>
             </a:r>
             <a:r>
               <a:rPr lang="en-US" sz="1800" dirty="0" err="1">
@@ -34019,14 +34063,53 @@
             </a:r>
             <a:r>
               <a:rPr lang="en-GB" sz="2400" dirty="0"/>
-              <a:t> B) / |D|	(support)</a:t>
+              <a:t> B) = count(A </a:t>
+            </a:r>
+            <a:r>
+              <a:rPr lang="en-US" sz="1800" dirty="0" err="1">
+                <a:latin typeface="Symbol" pitchFamily="18" charset="2"/>
+              </a:rPr>
+              <a:t>È</a:t>
+            </a:r>
+            <a:r>
+              <a:rPr lang="en-GB" sz="2400" dirty="0"/>
+              <a:t> B) / |D| (support)</a:t>
             </a:r>
           </a:p>
           <a:p>
             <a:pPr lvl="1"/>
             <a:r>
               <a:rPr lang="en-GB" sz="2400" dirty="0"/>
-              <a:t>c = p(B | A) = s(A </a:t>
+              <a:t>c(</a:t>
+            </a:r>
+            <a:r>
+              <a:rPr lang="en-US" sz="2400" dirty="0">
+                <a:latin typeface="Calibri" charset="0"/>
+                <a:ea typeface="Calibri" charset="0"/>
+                <a:cs typeface="Calibri" charset="0"/>
+              </a:rPr>
+              <a:t>A </a:t>
+            </a:r>
+            <a:r>
+              <a:rPr lang="en-GB" sz="2400" dirty="0">
+                <a:latin typeface="Wingdings"/>
+                <a:ea typeface="Wingdings"/>
+                <a:cs typeface="Wingdings"/>
+                <a:sym typeface="Wingdings"/>
+              </a:rPr>
+              <a:t></a:t>
+            </a:r>
+            <a:r>
+              <a:rPr lang="en-US" sz="2400" dirty="0">
+                <a:latin typeface="Calibri" charset="0"/>
+                <a:ea typeface="Calibri" charset="0"/>
+                <a:cs typeface="Calibri" charset="0"/>
+              </a:rPr>
+              <a:t> B)</a:t>
+            </a:r>
+            <a:r>
+              <a:rPr lang="en-GB" sz="2400" dirty="0"/>
+              <a:t> = p(B | A) = s(A </a:t>
             </a:r>
             <a:r>
               <a:rPr lang="en-US" sz="1800" dirty="0" err="1">

</xml_diff>